<commit_message>
fix laser. re-engineer ball physics
</commit_message>
<xml_diff>
--- a/Sprites/sprites.pptx
+++ b/Sprites/sprites.pptx
@@ -8,6 +8,7 @@
     <p:sldId id="256" r:id="rId2"/>
     <p:sldId id="258" r:id="rId3"/>
     <p:sldId id="260" r:id="rId4"/>
+    <p:sldId id="262" r:id="rId5"/>
   </p:sldIdLst>
   <p:sldSz cx="12192000" cy="6858000"/>
   <p:notesSz cx="6858000" cy="9144000"/>
@@ -267,7 +268,7 @@
           <a:p>
             <a:fld id="{79C5A860-F335-4252-AA00-24FB67ED2982}" type="datetime1">
               <a:rPr lang="en-US" smtClean="0"/>
-              <a:t>10/11/22</a:t>
+              <a:t>10/13/22</a:t>
             </a:fld>
             <a:endParaRPr lang="en-US"/>
           </a:p>
@@ -466,7 +467,7 @@
           <a:p>
             <a:fld id="{46AB1048-0047-48CA-88BA-D69B470942CF}" type="datetime1">
               <a:rPr lang="en-US" smtClean="0"/>
-              <a:t>10/11/22</a:t>
+              <a:t>10/13/22</a:t>
             </a:fld>
             <a:endParaRPr lang="en-US"/>
           </a:p>
@@ -676,7 +677,7 @@
           <a:p>
             <a:fld id="{5BD83879-648C-49A9-81A2-0EF5946532D0}" type="datetime1">
               <a:rPr lang="en-US" smtClean="0"/>
-              <a:t>10/11/22</a:t>
+              <a:t>10/13/22</a:t>
             </a:fld>
             <a:endParaRPr lang="en-US"/>
           </a:p>
@@ -874,7 +875,7 @@
           <a:p>
             <a:fld id="{D04BC802-30E3-4658-9CCA-F873646FEC67}" type="datetime1">
               <a:rPr lang="en-US" smtClean="0"/>
-              <a:t>10/11/22</a:t>
+              <a:t>10/13/22</a:t>
             </a:fld>
             <a:endParaRPr lang="en-US"/>
           </a:p>
@@ -1152,7 +1153,7 @@
           <a:p>
             <a:fld id="{0AB227A3-19CE-4153-81CE-64EB7AB094B3}" type="datetime1">
               <a:rPr lang="en-US" smtClean="0"/>
-              <a:t>10/11/22</a:t>
+              <a:t>10/13/22</a:t>
             </a:fld>
             <a:endParaRPr lang="en-US"/>
           </a:p>
@@ -1419,7 +1420,7 @@
           <a:p>
             <a:fld id="{B819A100-10F6-477E-8847-29D479EF1C92}" type="datetime1">
               <a:rPr lang="en-US" smtClean="0"/>
-              <a:t>10/11/22</a:t>
+              <a:t>10/13/22</a:t>
             </a:fld>
             <a:endParaRPr lang="en-US"/>
           </a:p>
@@ -1833,7 +1834,7 @@
           <a:p>
             <a:fld id="{5DF128AB-198A-495F-8475-FDB360C9873F}" type="datetime1">
               <a:rPr lang="en-US" smtClean="0"/>
-              <a:t>10/11/22</a:t>
+              <a:t>10/13/22</a:t>
             </a:fld>
             <a:endParaRPr lang="en-US"/>
           </a:p>
@@ -1974,7 +1975,7 @@
           <a:p>
             <a:fld id="{021A235E-F8FD-479F-9FC7-18BE84110877}" type="datetime1">
               <a:rPr lang="en-US" smtClean="0"/>
-              <a:t>10/11/22</a:t>
+              <a:t>10/13/22</a:t>
             </a:fld>
             <a:endParaRPr lang="en-US"/>
           </a:p>
@@ -2087,7 +2088,7 @@
           <a:p>
             <a:fld id="{E890F09B-68DA-462E-9DB4-4C9ADAB8CBCC}" type="datetime1">
               <a:rPr lang="en-US" smtClean="0"/>
-              <a:t>10/11/22</a:t>
+              <a:t>10/13/22</a:t>
             </a:fld>
             <a:endParaRPr lang="en-US"/>
           </a:p>
@@ -2406,7 +2407,7 @@
           <a:p>
             <a:fld id="{17AC4E36-FABE-47EB-AA7F-C19A93824617}" type="datetime1">
               <a:rPr lang="en-US" smtClean="0"/>
-              <a:t>10/11/22</a:t>
+              <a:t>10/13/22</a:t>
             </a:fld>
             <a:endParaRPr lang="en-US"/>
           </a:p>
@@ -2703,7 +2704,7 @@
           <a:p>
             <a:fld id="{F199CE6B-5DE6-4A2D-B72E-5E8969F9F56F}" type="datetime1">
               <a:rPr lang="en-US" smtClean="0"/>
-              <a:t>10/11/22</a:t>
+              <a:t>10/13/22</a:t>
             </a:fld>
             <a:endParaRPr lang="en-US"/>
           </a:p>
@@ -3561,7 +3562,7 @@
           <a:p>
             <a:fld id="{F481A142-DA77-4A5F-AD1F-14E6C18F0F5F}" type="datetime1">
               <a:rPr lang="en-US" smtClean="0"/>
-              <a:t>10/11/22</a:t>
+              <a:t>10/13/22</a:t>
             </a:fld>
             <a:endParaRPr lang="en-US" dirty="0"/>
           </a:p>
@@ -9588,7 +9589,7 @@
         </p:nvSpPr>
         <p:spPr>
           <a:xfrm>
-            <a:off x="5289969" y="1703493"/>
+            <a:off x="5321499" y="1703493"/>
             <a:ext cx="448056" cy="448056"/>
           </a:xfrm>
           <a:prstGeom prst="ellipse">
@@ -10576,6 +10577,990 @@
     <p:extLst>
       <p:ext uri="{BB962C8B-B14F-4D97-AF65-F5344CB8AC3E}">
         <p14:creationId xmlns:p14="http://schemas.microsoft.com/office/powerpoint/2010/main" val="429311712"/>
+      </p:ext>
+    </p:extLst>
+  </p:cSld>
+  <p:clrMapOvr>
+    <a:masterClrMapping/>
+  </p:clrMapOvr>
+</p:sld>
+</file>
+
+<file path=ppt/slides/slide4.xml><?xml version="1.0" encoding="utf-8"?>
+<p:sld xmlns:a="http://schemas.openxmlformats.org/drawingml/2006/main" xmlns:r="http://schemas.openxmlformats.org/officeDocument/2006/relationships" xmlns:p="http://schemas.openxmlformats.org/presentationml/2006/main">
+  <p:cSld>
+    <p:spTree>
+      <p:nvGrpSpPr>
+        <p:cNvPr id="1" name=""/>
+        <p:cNvGrpSpPr/>
+        <p:nvPr/>
+      </p:nvGrpSpPr>
+      <p:grpSpPr>
+        <a:xfrm>
+          <a:off x="0" y="0"/>
+          <a:ext cx="0" cy="0"/>
+          <a:chOff x="0" y="0"/>
+          <a:chExt cx="0" cy="0"/>
+        </a:xfrm>
+      </p:grpSpPr>
+      <p:sp>
+        <p:nvSpPr>
+          <p:cNvPr id="32" name="Rectangle 6">
+            <a:extLst>
+              <a:ext uri="{FF2B5EF4-FFF2-40B4-BE49-F238E27FC236}">
+                <a16:creationId xmlns:a16="http://schemas.microsoft.com/office/drawing/2014/main" id="{042E603F-28B7-4831-BF23-65FBAB13D5FB}"/>
+              </a:ext>
+              <a:ext uri="{C183D7F6-B498-43B3-948B-1728B52AA6E4}">
+                <adec:decorative xmlns:adec="http://schemas.microsoft.com/office/drawing/2017/decorative" val="1"/>
+              </a:ext>
+            </a:extLst>
+          </p:cNvPr>
+          <p:cNvSpPr>
+            <a:spLocks noGrp="1" noRot="1" noChangeAspect="1" noMove="1" noResize="1" noEditPoints="1" noAdjustHandles="1" noChangeArrowheads="1" noChangeShapeType="1" noTextEdit="1"/>
+          </p:cNvSpPr>
+          <p:nvPr>
+            <p:extLst>
+              <p:ext uri="{386F3935-93C4-4BCD-93E2-E3B085C9AB24}">
+                <p16:designElem xmlns:p16="http://schemas.microsoft.com/office/powerpoint/2015/main" val="1"/>
+              </p:ext>
+            </p:extLst>
+          </p:nvPr>
+        </p:nvSpPr>
+        <p:spPr>
+          <a:xfrm>
+            <a:off x="0" y="0"/>
+            <a:ext cx="12192001" cy="6858000"/>
+          </a:xfrm>
+          <a:prstGeom prst="rect">
+            <a:avLst/>
+          </a:prstGeom>
+          <a:solidFill>
+            <a:srgbClr val="AEAEAE">
+              <a:alpha val="10000"/>
+            </a:srgbClr>
+          </a:solidFill>
+          <a:ln w="76200">
+            <a:solidFill>
+              <a:schemeClr val="tx1"/>
+            </a:solidFill>
+          </a:ln>
+        </p:spPr>
+        <p:style>
+          <a:lnRef idx="2">
+            <a:schemeClr val="accent1">
+              <a:shade val="50000"/>
+            </a:schemeClr>
+          </a:lnRef>
+          <a:fillRef idx="1">
+            <a:schemeClr val="accent1"/>
+          </a:fillRef>
+          <a:effectRef idx="0">
+            <a:schemeClr val="accent1"/>
+          </a:effectRef>
+          <a:fontRef idx="minor">
+            <a:schemeClr val="lt1"/>
+          </a:fontRef>
+        </p:style>
+        <p:txBody>
+          <a:bodyPr rtlCol="0" anchor="ctr"/>
+          <a:lstStyle/>
+          <a:p>
+            <a:pPr algn="ctr"/>
+            <a:endParaRPr lang="en-US" dirty="0"/>
+          </a:p>
+        </p:txBody>
+      </p:sp>
+      <p:sp>
+        <p:nvSpPr>
+          <p:cNvPr id="9" name="Freeform: Shape 8">
+            <a:extLst>
+              <a:ext uri="{FF2B5EF4-FFF2-40B4-BE49-F238E27FC236}">
+                <a16:creationId xmlns:a16="http://schemas.microsoft.com/office/drawing/2014/main" id="{4D39700F-2B10-4402-A7DD-06EE2245880D}"/>
+              </a:ext>
+              <a:ext uri="{C183D7F6-B498-43B3-948B-1728B52AA6E4}">
+                <adec:decorative xmlns:adec="http://schemas.microsoft.com/office/drawing/2017/decorative" val="1"/>
+              </a:ext>
+            </a:extLst>
+          </p:cNvPr>
+          <p:cNvSpPr>
+            <a:spLocks noGrp="1" noRot="1" noChangeAspect="1" noMove="1" noResize="1" noEditPoints="1" noAdjustHandles="1" noChangeArrowheads="1" noChangeShapeType="1" noTextEdit="1"/>
+          </p:cNvSpPr>
+          <p:nvPr>
+            <p:extLst>
+              <p:ext uri="{386F3935-93C4-4BCD-93E2-E3B085C9AB24}">
+                <p16:designElem xmlns:p16="http://schemas.microsoft.com/office/powerpoint/2015/main" val="1"/>
+              </p:ext>
+            </p:extLst>
+          </p:nvPr>
+        </p:nvSpPr>
+        <p:spPr>
+          <a:xfrm>
+            <a:off x="-1" y="232968"/>
+            <a:ext cx="9560477" cy="6625032"/>
+          </a:xfrm>
+          <a:custGeom>
+            <a:avLst/>
+            <a:gdLst>
+              <a:gd name="connsiteX0" fmla="*/ 8831314 w 9263816"/>
+              <a:gd name="connsiteY0" fmla="*/ 5943878 h 6858000"/>
+              <a:gd name="connsiteX1" fmla="*/ 9179783 w 9263816"/>
+              <a:gd name="connsiteY1" fmla="*/ 6086141 h 6858000"/>
+              <a:gd name="connsiteX2" fmla="*/ 9260887 w 9263816"/>
+              <a:gd name="connsiteY2" fmla="*/ 6279156 h 6858000"/>
+              <a:gd name="connsiteX3" fmla="*/ 8925621 w 9263816"/>
+              <a:gd name="connsiteY3" fmla="*/ 6708712 h 6858000"/>
+              <a:gd name="connsiteX4" fmla="*/ 8496050 w 9263816"/>
+              <a:gd name="connsiteY4" fmla="*/ 6373449 h 6858000"/>
+              <a:gd name="connsiteX5" fmla="*/ 8831314 w 9263816"/>
+              <a:gd name="connsiteY5" fmla="*/ 5943878 h 6858000"/>
+              <a:gd name="connsiteX6" fmla="*/ 7397485 w 9263816"/>
+              <a:gd name="connsiteY6" fmla="*/ 5931706 h 6858000"/>
+              <a:gd name="connsiteX7" fmla="*/ 7917779 w 9263816"/>
+              <a:gd name="connsiteY7" fmla="*/ 6191864 h 6858000"/>
+              <a:gd name="connsiteX8" fmla="*/ 8013467 w 9263816"/>
+              <a:gd name="connsiteY8" fmla="*/ 6375784 h 6858000"/>
+              <a:gd name="connsiteX9" fmla="*/ 8021879 w 9263816"/>
+              <a:gd name="connsiteY9" fmla="*/ 6753751 h 6858000"/>
+              <a:gd name="connsiteX10" fmla="*/ 7981316 w 9263816"/>
+              <a:gd name="connsiteY10" fmla="*/ 6858000 h 6858000"/>
+              <a:gd name="connsiteX11" fmla="*/ 6819486 w 9263816"/>
+              <a:gd name="connsiteY11" fmla="*/ 6858000 h 6858000"/>
+              <a:gd name="connsiteX12" fmla="*/ 6785199 w 9263816"/>
+              <a:gd name="connsiteY12" fmla="*/ 6781101 h 6858000"/>
+              <a:gd name="connsiteX13" fmla="*/ 7196747 w 9263816"/>
+              <a:gd name="connsiteY13" fmla="*/ 5964309 h 6858000"/>
+              <a:gd name="connsiteX14" fmla="*/ 7397485 w 9263816"/>
+              <a:gd name="connsiteY14" fmla="*/ 5931706 h 6858000"/>
+              <a:gd name="connsiteX15" fmla="*/ 1505570 w 9263816"/>
+              <a:gd name="connsiteY15" fmla="*/ 227178 h 6858000"/>
+              <a:gd name="connsiteX16" fmla="*/ 2026489 w 9263816"/>
+              <a:gd name="connsiteY16" fmla="*/ 392370 h 6858000"/>
+              <a:gd name="connsiteX17" fmla="*/ 2444553 w 9263816"/>
+              <a:gd name="connsiteY17" fmla="*/ 1654853 h 6858000"/>
+              <a:gd name="connsiteX18" fmla="*/ 3183153 w 9263816"/>
+              <a:gd name="connsiteY18" fmla="*/ 2116208 h 6858000"/>
+              <a:gd name="connsiteX19" fmla="*/ 4288384 w 9263816"/>
+              <a:gd name="connsiteY19" fmla="*/ 1291908 h 6858000"/>
+              <a:gd name="connsiteX20" fmla="*/ 5472602 w 9263816"/>
+              <a:gd name="connsiteY20" fmla="*/ 1697818 h 6858000"/>
+              <a:gd name="connsiteX21" fmla="*/ 5844697 w 9263816"/>
+              <a:gd name="connsiteY21" fmla="*/ 3444791 h 6858000"/>
+              <a:gd name="connsiteX22" fmla="*/ 6715674 w 9263816"/>
+              <a:gd name="connsiteY22" fmla="*/ 4065208 h 6858000"/>
+              <a:gd name="connsiteX23" fmla="*/ 8130429 w 9263816"/>
+              <a:gd name="connsiteY23" fmla="*/ 4101787 h 6858000"/>
+              <a:gd name="connsiteX24" fmla="*/ 8624630 w 9263816"/>
+              <a:gd name="connsiteY24" fmla="*/ 4686202 h 6858000"/>
+              <a:gd name="connsiteX25" fmla="*/ 8623843 w 9263816"/>
+              <a:gd name="connsiteY25" fmla="*/ 4685749 h 6858000"/>
+              <a:gd name="connsiteX26" fmla="*/ 8646859 w 9263816"/>
+              <a:gd name="connsiteY26" fmla="*/ 4835156 h 6858000"/>
+              <a:gd name="connsiteX27" fmla="*/ 8079403 w 9263816"/>
+              <a:gd name="connsiteY27" fmla="*/ 5661624 h 6858000"/>
+              <a:gd name="connsiteX28" fmla="*/ 6833105 w 9263816"/>
+              <a:gd name="connsiteY28" fmla="*/ 5397208 h 6858000"/>
+              <a:gd name="connsiteX29" fmla="*/ 5900832 w 9263816"/>
+              <a:gd name="connsiteY29" fmla="*/ 5944462 h 6858000"/>
+              <a:gd name="connsiteX30" fmla="*/ 6067212 w 9263816"/>
+              <a:gd name="connsiteY30" fmla="*/ 6811916 h 6858000"/>
+              <a:gd name="connsiteX31" fmla="*/ 6089565 w 9263816"/>
+              <a:gd name="connsiteY31" fmla="*/ 6858000 h 6858000"/>
+              <a:gd name="connsiteX32" fmla="*/ 0 w 9263816"/>
+              <a:gd name="connsiteY32" fmla="*/ 6858000 h 6858000"/>
+              <a:gd name="connsiteX33" fmla="*/ 0 w 9263816"/>
+              <a:gd name="connsiteY33" fmla="*/ 2181377 h 6858000"/>
+              <a:gd name="connsiteX34" fmla="*/ 73069 w 9263816"/>
+              <a:gd name="connsiteY34" fmla="*/ 2215839 h 6858000"/>
+              <a:gd name="connsiteX35" fmla="*/ 335445 w 9263816"/>
+              <a:gd name="connsiteY35" fmla="*/ 2237140 h 6858000"/>
+              <a:gd name="connsiteX36" fmla="*/ 752878 w 9263816"/>
+              <a:gd name="connsiteY36" fmla="*/ 1445285 h 6858000"/>
+              <a:gd name="connsiteX37" fmla="*/ 1202551 w 9263816"/>
+              <a:gd name="connsiteY37" fmla="*/ 314229 h 6858000"/>
+              <a:gd name="connsiteX38" fmla="*/ 1505570 w 9263816"/>
+              <a:gd name="connsiteY38" fmla="*/ 227178 h 6858000"/>
+              <a:gd name="connsiteX39" fmla="*/ 3142509 w 9263816"/>
+              <a:gd name="connsiteY39" fmla="*/ 68854 h 6858000"/>
+              <a:gd name="connsiteX40" fmla="*/ 3490978 w 9263816"/>
+              <a:gd name="connsiteY40" fmla="*/ 211117 h 6858000"/>
+              <a:gd name="connsiteX41" fmla="*/ 3572083 w 9263816"/>
+              <a:gd name="connsiteY41" fmla="*/ 404131 h 6858000"/>
+              <a:gd name="connsiteX42" fmla="*/ 3236814 w 9263816"/>
+              <a:gd name="connsiteY42" fmla="*/ 833688 h 6858000"/>
+              <a:gd name="connsiteX43" fmla="*/ 2807245 w 9263816"/>
+              <a:gd name="connsiteY43" fmla="*/ 498425 h 6858000"/>
+              <a:gd name="connsiteX44" fmla="*/ 3142509 w 9263816"/>
+              <a:gd name="connsiteY44" fmla="*/ 68854 h 6858000"/>
+              <a:gd name="connsiteX45" fmla="*/ 0 w 9263816"/>
+              <a:gd name="connsiteY45" fmla="*/ 0 h 6858000"/>
+              <a:gd name="connsiteX46" fmla="*/ 39858 w 9263816"/>
+              <a:gd name="connsiteY46" fmla="*/ 0 h 6858000"/>
+              <a:gd name="connsiteX47" fmla="*/ 65022 w 9263816"/>
+              <a:gd name="connsiteY47" fmla="*/ 5834 h 6858000"/>
+              <a:gd name="connsiteX48" fmla="*/ 389258 w 9263816"/>
+              <a:gd name="connsiteY48" fmla="*/ 235630 h 6858000"/>
+              <a:gd name="connsiteX49" fmla="*/ 485484 w 9263816"/>
+              <a:gd name="connsiteY49" fmla="*/ 420070 h 6858000"/>
+              <a:gd name="connsiteX50" fmla="*/ 74229 w 9263816"/>
+              <a:gd name="connsiteY50" fmla="*/ 1237955 h 6858000"/>
+              <a:gd name="connsiteX51" fmla="*/ 0 w 9263816"/>
+              <a:gd name="connsiteY51" fmla="*/ 1254477 h 6858000"/>
+            </a:gdLst>
+            <a:ahLst/>
+            <a:cxnLst>
+              <a:cxn ang="0">
+                <a:pos x="connsiteX0" y="connsiteY0"/>
+              </a:cxn>
+              <a:cxn ang="0">
+                <a:pos x="connsiteX1" y="connsiteY1"/>
+              </a:cxn>
+              <a:cxn ang="0">
+                <a:pos x="connsiteX2" y="connsiteY2"/>
+              </a:cxn>
+              <a:cxn ang="0">
+                <a:pos x="connsiteX3" y="connsiteY3"/>
+              </a:cxn>
+              <a:cxn ang="0">
+                <a:pos x="connsiteX4" y="connsiteY4"/>
+              </a:cxn>
+              <a:cxn ang="0">
+                <a:pos x="connsiteX5" y="connsiteY5"/>
+              </a:cxn>
+              <a:cxn ang="0">
+                <a:pos x="connsiteX6" y="connsiteY6"/>
+              </a:cxn>
+              <a:cxn ang="0">
+                <a:pos x="connsiteX7" y="connsiteY7"/>
+              </a:cxn>
+              <a:cxn ang="0">
+                <a:pos x="connsiteX8" y="connsiteY8"/>
+              </a:cxn>
+              <a:cxn ang="0">
+                <a:pos x="connsiteX9" y="connsiteY9"/>
+              </a:cxn>
+              <a:cxn ang="0">
+                <a:pos x="connsiteX10" y="connsiteY10"/>
+              </a:cxn>
+              <a:cxn ang="0">
+                <a:pos x="connsiteX11" y="connsiteY11"/>
+              </a:cxn>
+              <a:cxn ang="0">
+                <a:pos x="connsiteX12" y="connsiteY12"/>
+              </a:cxn>
+              <a:cxn ang="0">
+                <a:pos x="connsiteX13" y="connsiteY13"/>
+              </a:cxn>
+              <a:cxn ang="0">
+                <a:pos x="connsiteX14" y="connsiteY14"/>
+              </a:cxn>
+              <a:cxn ang="0">
+                <a:pos x="connsiteX15" y="connsiteY15"/>
+              </a:cxn>
+              <a:cxn ang="0">
+                <a:pos x="connsiteX16" y="connsiteY16"/>
+              </a:cxn>
+              <a:cxn ang="0">
+                <a:pos x="connsiteX17" y="connsiteY17"/>
+              </a:cxn>
+              <a:cxn ang="0">
+                <a:pos x="connsiteX18" y="connsiteY18"/>
+              </a:cxn>
+              <a:cxn ang="0">
+                <a:pos x="connsiteX19" y="connsiteY19"/>
+              </a:cxn>
+              <a:cxn ang="0">
+                <a:pos x="connsiteX20" y="connsiteY20"/>
+              </a:cxn>
+              <a:cxn ang="0">
+                <a:pos x="connsiteX21" y="connsiteY21"/>
+              </a:cxn>
+              <a:cxn ang="0">
+                <a:pos x="connsiteX22" y="connsiteY22"/>
+              </a:cxn>
+              <a:cxn ang="0">
+                <a:pos x="connsiteX23" y="connsiteY23"/>
+              </a:cxn>
+              <a:cxn ang="0">
+                <a:pos x="connsiteX24" y="connsiteY24"/>
+              </a:cxn>
+              <a:cxn ang="0">
+                <a:pos x="connsiteX25" y="connsiteY25"/>
+              </a:cxn>
+              <a:cxn ang="0">
+                <a:pos x="connsiteX26" y="connsiteY26"/>
+              </a:cxn>
+              <a:cxn ang="0">
+                <a:pos x="connsiteX27" y="connsiteY27"/>
+              </a:cxn>
+              <a:cxn ang="0">
+                <a:pos x="connsiteX28" y="connsiteY28"/>
+              </a:cxn>
+              <a:cxn ang="0">
+                <a:pos x="connsiteX29" y="connsiteY29"/>
+              </a:cxn>
+              <a:cxn ang="0">
+                <a:pos x="connsiteX30" y="connsiteY30"/>
+              </a:cxn>
+              <a:cxn ang="0">
+                <a:pos x="connsiteX31" y="connsiteY31"/>
+              </a:cxn>
+              <a:cxn ang="0">
+                <a:pos x="connsiteX32" y="connsiteY32"/>
+              </a:cxn>
+              <a:cxn ang="0">
+                <a:pos x="connsiteX33" y="connsiteY33"/>
+              </a:cxn>
+              <a:cxn ang="0">
+                <a:pos x="connsiteX34" y="connsiteY34"/>
+              </a:cxn>
+              <a:cxn ang="0">
+                <a:pos x="connsiteX35" y="connsiteY35"/>
+              </a:cxn>
+              <a:cxn ang="0">
+                <a:pos x="connsiteX36" y="connsiteY36"/>
+              </a:cxn>
+              <a:cxn ang="0">
+                <a:pos x="connsiteX37" y="connsiteY37"/>
+              </a:cxn>
+              <a:cxn ang="0">
+                <a:pos x="connsiteX38" y="connsiteY38"/>
+              </a:cxn>
+              <a:cxn ang="0">
+                <a:pos x="connsiteX39" y="connsiteY39"/>
+              </a:cxn>
+              <a:cxn ang="0">
+                <a:pos x="connsiteX40" y="connsiteY40"/>
+              </a:cxn>
+              <a:cxn ang="0">
+                <a:pos x="connsiteX41" y="connsiteY41"/>
+              </a:cxn>
+              <a:cxn ang="0">
+                <a:pos x="connsiteX42" y="connsiteY42"/>
+              </a:cxn>
+              <a:cxn ang="0">
+                <a:pos x="connsiteX43" y="connsiteY43"/>
+              </a:cxn>
+              <a:cxn ang="0">
+                <a:pos x="connsiteX44" y="connsiteY44"/>
+              </a:cxn>
+              <a:cxn ang="0">
+                <a:pos x="connsiteX45" y="connsiteY45"/>
+              </a:cxn>
+              <a:cxn ang="0">
+                <a:pos x="connsiteX46" y="connsiteY46"/>
+              </a:cxn>
+              <a:cxn ang="0">
+                <a:pos x="connsiteX47" y="connsiteY47"/>
+              </a:cxn>
+              <a:cxn ang="0">
+                <a:pos x="connsiteX48" y="connsiteY48"/>
+              </a:cxn>
+              <a:cxn ang="0">
+                <a:pos x="connsiteX49" y="connsiteY49"/>
+              </a:cxn>
+              <a:cxn ang="0">
+                <a:pos x="connsiteX50" y="connsiteY50"/>
+              </a:cxn>
+              <a:cxn ang="0">
+                <a:pos x="connsiteX51" y="connsiteY51"/>
+              </a:cxn>
+            </a:cxnLst>
+            <a:rect l="l" t="t" r="r" b="b"/>
+            <a:pathLst>
+              <a:path w="9263816" h="6858000">
+                <a:moveTo>
+                  <a:pt x="8831314" y="5943878"/>
+                </a:moveTo>
+                <a:cubicBezTo>
+                  <a:pt x="8964281" y="5927490"/>
+                  <a:pt x="9096260" y="5981362"/>
+                  <a:pt x="9179783" y="6086141"/>
+                </a:cubicBezTo>
+                <a:cubicBezTo>
+                  <a:pt x="9224074" y="6141769"/>
+                  <a:pt x="9252211" y="6208560"/>
+                  <a:pt x="9260887" y="6279156"/>
+                </a:cubicBezTo>
+                <a:cubicBezTo>
+                  <a:pt x="9286897" y="6490362"/>
+                  <a:pt x="9136845" y="6682672"/>
+                  <a:pt x="8925621" y="6708712"/>
+                </a:cubicBezTo>
+                <a:cubicBezTo>
+                  <a:pt x="8714398" y="6734766"/>
+                  <a:pt x="8522062" y="6584655"/>
+                  <a:pt x="8496050" y="6373449"/>
+                </a:cubicBezTo>
+                <a:cubicBezTo>
+                  <a:pt x="8470038" y="6162229"/>
+                  <a:pt x="8620090" y="5969920"/>
+                  <a:pt x="8831314" y="5943878"/>
+                </a:cubicBezTo>
+                <a:close/>
+                <a:moveTo>
+                  <a:pt x="7397485" y="5931706"/>
+                </a:moveTo>
+                <a:cubicBezTo>
+                  <a:pt x="7598431" y="5931157"/>
+                  <a:pt x="7792965" y="6024548"/>
+                  <a:pt x="7917779" y="6191864"/>
+                </a:cubicBezTo>
+                <a:cubicBezTo>
+                  <a:pt x="7959204" y="6247714"/>
+                  <a:pt x="7991530" y="6309792"/>
+                  <a:pt x="8013467" y="6375784"/>
+                </a:cubicBezTo>
+                <a:cubicBezTo>
+                  <a:pt x="8055425" y="6502973"/>
+                  <a:pt x="8055748" y="6633888"/>
+                  <a:pt x="8021879" y="6753751"/>
+                </a:cubicBezTo>
+                <a:lnTo>
+                  <a:pt x="7981316" y="6858000"/>
+                </a:lnTo>
+                <a:lnTo>
+                  <a:pt x="6819486" y="6858000"/>
+                </a:lnTo>
+                <a:lnTo>
+                  <a:pt x="6785199" y="6781101"/>
+                </a:lnTo>
+                <a:cubicBezTo>
+                  <a:pt x="6673307" y="6441922"/>
+                  <a:pt x="6857485" y="6076251"/>
+                  <a:pt x="7196747" y="5964309"/>
+                </a:cubicBezTo>
+                <a:cubicBezTo>
+                  <a:pt x="7262809" y="5942509"/>
+                  <a:pt x="7330503" y="5931889"/>
+                  <a:pt x="7397485" y="5931706"/>
+                </a:cubicBezTo>
+                <a:close/>
+                <a:moveTo>
+                  <a:pt x="1505570" y="227178"/>
+                </a:moveTo>
+                <a:cubicBezTo>
+                  <a:pt x="1691018" y="218628"/>
+                  <a:pt x="1889853" y="275403"/>
+                  <a:pt x="2026489" y="392370"/>
+                </a:cubicBezTo>
+                <a:cubicBezTo>
+                  <a:pt x="2369898" y="685965"/>
+                  <a:pt x="2078266" y="1147857"/>
+                  <a:pt x="2444553" y="1654853"/>
+                </a:cubicBezTo>
+                <a:cubicBezTo>
+                  <a:pt x="2492906" y="1721679"/>
+                  <a:pt x="2800482" y="2144546"/>
+                  <a:pt x="3183153" y="2116208"/>
+                </a:cubicBezTo>
+                <a:cubicBezTo>
+                  <a:pt x="3673561" y="2080541"/>
+                  <a:pt x="3723222" y="1441614"/>
+                  <a:pt x="4288384" y="1291908"/>
+                </a:cubicBezTo>
+                <a:cubicBezTo>
+                  <a:pt x="4689065" y="1185875"/>
+                  <a:pt x="5207943" y="1366633"/>
+                  <a:pt x="5472602" y="1697818"/>
+                </a:cubicBezTo>
+                <a:cubicBezTo>
+                  <a:pt x="5891294" y="2221754"/>
+                  <a:pt x="5408012" y="2790179"/>
+                  <a:pt x="5844697" y="3444791"/>
+                </a:cubicBezTo>
+                <a:cubicBezTo>
+                  <a:pt x="6149900" y="3902467"/>
+                  <a:pt x="6672672" y="4053594"/>
+                  <a:pt x="6715674" y="4065208"/>
+                </a:cubicBezTo>
+                <a:cubicBezTo>
+                  <a:pt x="7326423" y="4232519"/>
+                  <a:pt x="7677158" y="3817020"/>
+                  <a:pt x="8130429" y="4101787"/>
+                </a:cubicBezTo>
+                <a:cubicBezTo>
+                  <a:pt x="8226340" y="4161985"/>
+                  <a:pt x="8536372" y="4356819"/>
+                  <a:pt x="8624630" y="4686202"/>
+                </a:cubicBezTo>
+                <a:lnTo>
+                  <a:pt x="8623843" y="4685749"/>
+                </a:lnTo>
+                <a:cubicBezTo>
+                  <a:pt x="8636924" y="4734567"/>
+                  <a:pt x="8644635" y="4784678"/>
+                  <a:pt x="8646859" y="4835156"/>
+                </a:cubicBezTo>
+                <a:cubicBezTo>
+                  <a:pt x="8662596" y="5196604"/>
+                  <a:pt x="8398383" y="5562326"/>
+                  <a:pt x="8079403" y="5661624"/>
+                </a:cubicBezTo>
+                <a:cubicBezTo>
+                  <a:pt x="7649807" y="5795217"/>
+                  <a:pt x="7430996" y="5350293"/>
+                  <a:pt x="6833105" y="5397208"/>
+                </a:cubicBezTo>
+                <a:cubicBezTo>
+                  <a:pt x="6519033" y="5421527"/>
+                  <a:pt x="6056658" y="5595550"/>
+                  <a:pt x="5900832" y="5944462"/>
+                </a:cubicBezTo>
+                <a:cubicBezTo>
+                  <a:pt x="5770548" y="6236600"/>
+                  <a:pt x="5916359" y="6515160"/>
+                  <a:pt x="6067212" y="6811916"/>
+                </a:cubicBezTo>
+                <a:lnTo>
+                  <a:pt x="6089565" y="6858000"/>
+                </a:lnTo>
+                <a:lnTo>
+                  <a:pt x="0" y="6858000"/>
+                </a:lnTo>
+                <a:lnTo>
+                  <a:pt x="0" y="2181377"/>
+                </a:lnTo>
+                <a:lnTo>
+                  <a:pt x="73069" y="2215839"/>
+                </a:lnTo>
+                <a:cubicBezTo>
+                  <a:pt x="165116" y="2251829"/>
+                  <a:pt x="254486" y="2263171"/>
+                  <a:pt x="335445" y="2237140"/>
+                </a:cubicBezTo>
+                <a:cubicBezTo>
+                  <a:pt x="594718" y="2153707"/>
+                  <a:pt x="688441" y="1733807"/>
+                  <a:pt x="752878" y="1445285"/>
+                </a:cubicBezTo>
+                <a:cubicBezTo>
+                  <a:pt x="925059" y="674068"/>
+                  <a:pt x="975076" y="456292"/>
+                  <a:pt x="1202551" y="314229"/>
+                </a:cubicBezTo>
+                <a:cubicBezTo>
+                  <a:pt x="1287853" y="260956"/>
+                  <a:pt x="1394302" y="232308"/>
+                  <a:pt x="1505570" y="227178"/>
+                </a:cubicBezTo>
+                <a:close/>
+                <a:moveTo>
+                  <a:pt x="3142509" y="68854"/>
+                </a:moveTo>
+                <a:cubicBezTo>
+                  <a:pt x="3275474" y="52467"/>
+                  <a:pt x="3407455" y="106339"/>
+                  <a:pt x="3490978" y="211117"/>
+                </a:cubicBezTo>
+                <a:cubicBezTo>
+                  <a:pt x="3535271" y="266744"/>
+                  <a:pt x="3563404" y="333535"/>
+                  <a:pt x="3572083" y="404131"/>
+                </a:cubicBezTo>
+                <a:cubicBezTo>
+                  <a:pt x="3598092" y="615337"/>
+                  <a:pt x="3448040" y="807648"/>
+                  <a:pt x="3236814" y="833688"/>
+                </a:cubicBezTo>
+                <a:cubicBezTo>
+                  <a:pt x="3025594" y="859741"/>
+                  <a:pt x="2833255" y="709631"/>
+                  <a:pt x="2807245" y="498425"/>
+                </a:cubicBezTo>
+                <a:cubicBezTo>
+                  <a:pt x="2781232" y="287207"/>
+                  <a:pt x="2931283" y="94896"/>
+                  <a:pt x="3142509" y="68854"/>
+                </a:cubicBezTo>
+                <a:close/>
+                <a:moveTo>
+                  <a:pt x="0" y="0"/>
+                </a:moveTo>
+                <a:lnTo>
+                  <a:pt x="39858" y="0"/>
+                </a:lnTo>
+                <a:lnTo>
+                  <a:pt x="65022" y="5834"/>
+                </a:lnTo>
+                <a:cubicBezTo>
+                  <a:pt x="191545" y="45606"/>
+                  <a:pt x="305874" y="124173"/>
+                  <a:pt x="389258" y="235630"/>
+                </a:cubicBezTo>
+                <a:cubicBezTo>
+                  <a:pt x="430983" y="291600"/>
+                  <a:pt x="463360" y="353876"/>
+                  <a:pt x="485484" y="420070"/>
+                </a:cubicBezTo>
+                <a:cubicBezTo>
+                  <a:pt x="597711" y="759508"/>
+                  <a:pt x="413661" y="1125662"/>
+                  <a:pt x="74229" y="1237955"/>
+                </a:cubicBezTo>
+                <a:lnTo>
+                  <a:pt x="0" y="1254477"/>
+                </a:lnTo>
+                <a:close/>
+              </a:path>
+            </a:pathLst>
+          </a:custGeom>
+          <a:solidFill>
+            <a:schemeClr val="bg1"/>
+          </a:solidFill>
+          <a:ln w="76200">
+            <a:solidFill>
+              <a:schemeClr val="tx1"/>
+            </a:solidFill>
+          </a:ln>
+        </p:spPr>
+        <p:style>
+          <a:lnRef idx="2">
+            <a:schemeClr val="accent1">
+              <a:shade val="50000"/>
+            </a:schemeClr>
+          </a:lnRef>
+          <a:fillRef idx="1">
+            <a:schemeClr val="accent1"/>
+          </a:fillRef>
+          <a:effectRef idx="0">
+            <a:schemeClr val="accent1"/>
+          </a:effectRef>
+          <a:fontRef idx="minor">
+            <a:schemeClr val="lt1"/>
+          </a:fontRef>
+        </p:style>
+        <p:txBody>
+          <a:bodyPr wrap="square" rtlCol="0" anchor="ctr">
+            <a:noAutofit/>
+          </a:bodyPr>
+          <a:lstStyle/>
+          <a:p>
+            <a:pPr algn="ctr"/>
+            <a:endParaRPr lang="en-US"/>
+          </a:p>
+        </p:txBody>
+      </p:sp>
+      <p:sp useBgFill="1">
+        <p:nvSpPr>
+          <p:cNvPr id="11" name="Background Fill">
+            <a:extLst>
+              <a:ext uri="{FF2B5EF4-FFF2-40B4-BE49-F238E27FC236}">
+                <a16:creationId xmlns:a16="http://schemas.microsoft.com/office/drawing/2014/main" id="{68CA250C-CF5A-4736-9249-D6111F7C5545}"/>
+              </a:ext>
+              <a:ext uri="{C183D7F6-B498-43B3-948B-1728B52AA6E4}">
+                <adec:decorative xmlns:adec="http://schemas.microsoft.com/office/drawing/2017/decorative" val="1"/>
+              </a:ext>
+            </a:extLst>
+          </p:cNvPr>
+          <p:cNvSpPr>
+            <a:spLocks noGrp="1" noRot="1" noChangeAspect="1" noMove="1" noResize="1" noEditPoints="1" noAdjustHandles="1" noChangeArrowheads="1" noChangeShapeType="1" noTextEdit="1"/>
+          </p:cNvSpPr>
+          <p:nvPr>
+            <p:extLst>
+              <p:ext uri="{386F3935-93C4-4BCD-93E2-E3B085C9AB24}">
+                <p16:designElem xmlns:p16="http://schemas.microsoft.com/office/powerpoint/2015/main" val="1"/>
+              </p:ext>
+            </p:extLst>
+          </p:nvPr>
+        </p:nvSpPr>
+        <p:spPr>
+          <a:xfrm>
+            <a:off x="0" y="0"/>
+            <a:ext cx="12188952" cy="6858000"/>
+          </a:xfrm>
+          <a:prstGeom prst="rect">
+            <a:avLst/>
+          </a:prstGeom>
+          <a:ln w="76200">
+            <a:solidFill>
+              <a:schemeClr val="tx1"/>
+            </a:solidFill>
+          </a:ln>
+        </p:spPr>
+        <p:style>
+          <a:lnRef idx="2">
+            <a:schemeClr val="accent1">
+              <a:shade val="50000"/>
+            </a:schemeClr>
+          </a:lnRef>
+          <a:fillRef idx="1">
+            <a:schemeClr val="accent1"/>
+          </a:fillRef>
+          <a:effectRef idx="0">
+            <a:schemeClr val="accent1"/>
+          </a:effectRef>
+          <a:fontRef idx="minor">
+            <a:schemeClr val="lt1"/>
+          </a:fontRef>
+        </p:style>
+        <p:txBody>
+          <a:bodyPr rtlCol="0" anchor="ctr"/>
+          <a:lstStyle/>
+          <a:p>
+            <a:pPr algn="ctr"/>
+            <a:endParaRPr lang="en-US"/>
+          </a:p>
+        </p:txBody>
+      </p:sp>
+      <p:sp useBgFill="1">
+        <p:nvSpPr>
+          <p:cNvPr id="13" name="Background Fill">
+            <a:extLst>
+              <a:ext uri="{FF2B5EF4-FFF2-40B4-BE49-F238E27FC236}">
+                <a16:creationId xmlns:a16="http://schemas.microsoft.com/office/drawing/2014/main" id="{03FBC970-8DCC-4E64-B5E9-8903D562A6DE}"/>
+              </a:ext>
+              <a:ext uri="{C183D7F6-B498-43B3-948B-1728B52AA6E4}">
+                <adec:decorative xmlns:adec="http://schemas.microsoft.com/office/drawing/2017/decorative" val="1"/>
+              </a:ext>
+            </a:extLst>
+          </p:cNvPr>
+          <p:cNvSpPr>
+            <a:spLocks noGrp="1" noRot="1" noChangeAspect="1" noMove="1" noResize="1" noEditPoints="1" noAdjustHandles="1" noChangeArrowheads="1" noChangeShapeType="1" noTextEdit="1"/>
+          </p:cNvSpPr>
+          <p:nvPr>
+            <p:extLst>
+              <p:ext uri="{386F3935-93C4-4BCD-93E2-E3B085C9AB24}">
+                <p16:designElem xmlns:p16="http://schemas.microsoft.com/office/powerpoint/2015/main" val="1"/>
+              </p:ext>
+            </p:extLst>
+          </p:nvPr>
+        </p:nvSpPr>
+        <p:spPr>
+          <a:xfrm>
+            <a:off x="3048" y="0"/>
+            <a:ext cx="12188952" cy="6858000"/>
+          </a:xfrm>
+          <a:prstGeom prst="rect">
+            <a:avLst/>
+          </a:prstGeom>
+          <a:ln w="76200">
+            <a:solidFill>
+              <a:schemeClr val="tx1"/>
+            </a:solidFill>
+          </a:ln>
+        </p:spPr>
+        <p:style>
+          <a:lnRef idx="2">
+            <a:schemeClr val="accent1">
+              <a:shade val="50000"/>
+            </a:schemeClr>
+          </a:lnRef>
+          <a:fillRef idx="1">
+            <a:schemeClr val="accent1"/>
+          </a:fillRef>
+          <a:effectRef idx="0">
+            <a:schemeClr val="accent1"/>
+          </a:effectRef>
+          <a:fontRef idx="minor">
+            <a:schemeClr val="lt1"/>
+          </a:fontRef>
+        </p:style>
+        <p:txBody>
+          <a:bodyPr rtlCol="0" anchor="ctr"/>
+          <a:lstStyle/>
+          <a:p>
+            <a:pPr algn="ctr"/>
+            <a:endParaRPr lang="en-US"/>
+          </a:p>
+        </p:txBody>
+      </p:sp>
+      <p:grpSp>
+        <p:nvGrpSpPr>
+          <p:cNvPr id="3" name="Group 2">
+            <a:extLst>
+              <a:ext uri="{FF2B5EF4-FFF2-40B4-BE49-F238E27FC236}">
+                <a16:creationId xmlns:a16="http://schemas.microsoft.com/office/drawing/2014/main" id="{3520E5B9-EAC0-A5E4-6BD5-94D6DAF46B6B}"/>
+              </a:ext>
+            </a:extLst>
+          </p:cNvPr>
+          <p:cNvGrpSpPr/>
+          <p:nvPr/>
+        </p:nvGrpSpPr>
+        <p:grpSpPr>
+          <a:xfrm>
+            <a:off x="7535916" y="1376854"/>
+            <a:ext cx="126125" cy="3573521"/>
+            <a:chOff x="7535916" y="609600"/>
+            <a:chExt cx="168172" cy="4340776"/>
+          </a:xfrm>
+        </p:grpSpPr>
+        <p:sp>
+          <p:nvSpPr>
+            <p:cNvPr id="6" name="Rectangle 5">
+              <a:extLst>
+                <a:ext uri="{FF2B5EF4-FFF2-40B4-BE49-F238E27FC236}">
+                  <a16:creationId xmlns:a16="http://schemas.microsoft.com/office/drawing/2014/main" id="{CB8509B2-F28A-0294-1310-1CE43A8E7E89}"/>
+                </a:ext>
+              </a:extLst>
+            </p:cNvPr>
+            <p:cNvSpPr/>
+            <p:nvPr/>
+          </p:nvSpPr>
+          <p:spPr>
+            <a:xfrm rot="10800000" flipV="1">
+              <a:off x="7535916" y="609600"/>
+              <a:ext cx="84086" cy="4340776"/>
+            </a:xfrm>
+            <a:prstGeom prst="rect">
+              <a:avLst/>
+            </a:prstGeom>
+            <a:gradFill flip="none" rotWithShape="1">
+              <a:gsLst>
+                <a:gs pos="0">
+                  <a:srgbClr val="FF0000">
+                    <a:tint val="66000"/>
+                    <a:satMod val="160000"/>
+                  </a:srgbClr>
+                </a:gs>
+                <a:gs pos="50000">
+                  <a:srgbClr val="FF0000">
+                    <a:tint val="44500"/>
+                    <a:satMod val="160000"/>
+                  </a:srgbClr>
+                </a:gs>
+                <a:gs pos="100000">
+                  <a:srgbClr val="FF0000">
+                    <a:tint val="23500"/>
+                    <a:satMod val="160000"/>
+                  </a:srgbClr>
+                </a:gs>
+              </a:gsLst>
+              <a:lin ang="0" scaled="1"/>
+              <a:tileRect/>
+            </a:gradFill>
+            <a:ln>
+              <a:noFill/>
+            </a:ln>
+          </p:spPr>
+          <p:style>
+            <a:lnRef idx="2">
+              <a:schemeClr val="accent1">
+                <a:shade val="50000"/>
+              </a:schemeClr>
+            </a:lnRef>
+            <a:fillRef idx="1">
+              <a:schemeClr val="accent1"/>
+            </a:fillRef>
+            <a:effectRef idx="0">
+              <a:schemeClr val="accent1"/>
+            </a:effectRef>
+            <a:fontRef idx="minor">
+              <a:schemeClr val="lt1"/>
+            </a:fontRef>
+          </p:style>
+          <p:txBody>
+            <a:bodyPr rtlCol="0" anchor="ctr"/>
+            <a:lstStyle/>
+            <a:p>
+              <a:pPr algn="ctr"/>
+              <a:endParaRPr lang="en-US">
+                <a:ln w="0"/>
+                <a:gradFill>
+                  <a:gsLst>
+                    <a:gs pos="21000">
+                      <a:srgbClr val="53575C"/>
+                    </a:gs>
+                    <a:gs pos="88000">
+                      <a:srgbClr val="C5C7CA"/>
+                    </a:gs>
+                  </a:gsLst>
+                  <a:lin ang="5400000"/>
+                </a:gradFill>
+              </a:endParaRPr>
+            </a:p>
+          </p:txBody>
+        </p:sp>
+        <p:sp>
+          <p:nvSpPr>
+            <p:cNvPr id="2" name="Rectangle 1">
+              <a:extLst>
+                <a:ext uri="{FF2B5EF4-FFF2-40B4-BE49-F238E27FC236}">
+                  <a16:creationId xmlns:a16="http://schemas.microsoft.com/office/drawing/2014/main" id="{81362C3A-D831-C617-70E2-2DF08D4C5B4B}"/>
+                </a:ext>
+              </a:extLst>
+            </p:cNvPr>
+            <p:cNvSpPr/>
+            <p:nvPr/>
+          </p:nvSpPr>
+          <p:spPr>
+            <a:xfrm rot="10800000" flipV="1">
+              <a:off x="7620002" y="609600"/>
+              <a:ext cx="84086" cy="4340776"/>
+            </a:xfrm>
+            <a:prstGeom prst="rect">
+              <a:avLst/>
+            </a:prstGeom>
+            <a:gradFill flip="none" rotWithShape="1">
+              <a:gsLst>
+                <a:gs pos="0">
+                  <a:srgbClr val="FF0000">
+                    <a:tint val="66000"/>
+                    <a:satMod val="160000"/>
+                  </a:srgbClr>
+                </a:gs>
+                <a:gs pos="50000">
+                  <a:srgbClr val="FF0000">
+                    <a:tint val="44500"/>
+                    <a:satMod val="160000"/>
+                  </a:srgbClr>
+                </a:gs>
+                <a:gs pos="100000">
+                  <a:srgbClr val="FF0000">
+                    <a:tint val="23500"/>
+                    <a:satMod val="160000"/>
+                  </a:srgbClr>
+                </a:gs>
+              </a:gsLst>
+              <a:lin ang="10800000" scaled="1"/>
+              <a:tileRect/>
+            </a:gradFill>
+            <a:ln>
+              <a:noFill/>
+            </a:ln>
+          </p:spPr>
+          <p:style>
+            <a:lnRef idx="2">
+              <a:schemeClr val="accent1">
+                <a:shade val="50000"/>
+              </a:schemeClr>
+            </a:lnRef>
+            <a:fillRef idx="1">
+              <a:schemeClr val="accent1"/>
+            </a:fillRef>
+            <a:effectRef idx="0">
+              <a:schemeClr val="accent1"/>
+            </a:effectRef>
+            <a:fontRef idx="minor">
+              <a:schemeClr val="lt1"/>
+            </a:fontRef>
+          </p:style>
+          <p:txBody>
+            <a:bodyPr rtlCol="0" anchor="ctr"/>
+            <a:lstStyle/>
+            <a:p>
+              <a:pPr algn="ctr"/>
+              <a:endParaRPr lang="en-US">
+                <a:ln w="0"/>
+                <a:gradFill>
+                  <a:gsLst>
+                    <a:gs pos="21000">
+                      <a:srgbClr val="53575C"/>
+                    </a:gs>
+                    <a:gs pos="88000">
+                      <a:srgbClr val="C5C7CA"/>
+                    </a:gs>
+                  </a:gsLst>
+                  <a:lin ang="5400000"/>
+                </a:gradFill>
+              </a:endParaRPr>
+            </a:p>
+          </p:txBody>
+        </p:sp>
+      </p:grpSp>
+    </p:spTree>
+    <p:extLst>
+      <p:ext uri="{BB962C8B-B14F-4D97-AF65-F5344CB8AC3E}">
+        <p14:creationId xmlns:p14="http://schemas.microsoft.com/office/powerpoint/2010/main" val="1632031743"/>
       </p:ext>
     </p:extLst>
   </p:cSld>

</xml_diff>

<commit_message>
setup global vars; add 'lives' feature
</commit_message>
<xml_diff>
--- a/Sprites/sprites.pptx
+++ b/Sprites/sprites.pptx
@@ -268,7 +268,7 @@
           <a:p>
             <a:fld id="{79C5A860-F335-4252-AA00-24FB67ED2982}" type="datetime1">
               <a:rPr lang="en-US" smtClean="0"/>
-              <a:t>10/13/22</a:t>
+              <a:t>10/15/22</a:t>
             </a:fld>
             <a:endParaRPr lang="en-US"/>
           </a:p>
@@ -467,7 +467,7 @@
           <a:p>
             <a:fld id="{46AB1048-0047-48CA-88BA-D69B470942CF}" type="datetime1">
               <a:rPr lang="en-US" smtClean="0"/>
-              <a:t>10/13/22</a:t>
+              <a:t>10/15/22</a:t>
             </a:fld>
             <a:endParaRPr lang="en-US"/>
           </a:p>
@@ -677,7 +677,7 @@
           <a:p>
             <a:fld id="{5BD83879-648C-49A9-81A2-0EF5946532D0}" type="datetime1">
               <a:rPr lang="en-US" smtClean="0"/>
-              <a:t>10/13/22</a:t>
+              <a:t>10/15/22</a:t>
             </a:fld>
             <a:endParaRPr lang="en-US"/>
           </a:p>
@@ -875,7 +875,7 @@
           <a:p>
             <a:fld id="{D04BC802-30E3-4658-9CCA-F873646FEC67}" type="datetime1">
               <a:rPr lang="en-US" smtClean="0"/>
-              <a:t>10/13/22</a:t>
+              <a:t>10/15/22</a:t>
             </a:fld>
             <a:endParaRPr lang="en-US"/>
           </a:p>
@@ -1153,7 +1153,7 @@
           <a:p>
             <a:fld id="{0AB227A3-19CE-4153-81CE-64EB7AB094B3}" type="datetime1">
               <a:rPr lang="en-US" smtClean="0"/>
-              <a:t>10/13/22</a:t>
+              <a:t>10/15/22</a:t>
             </a:fld>
             <a:endParaRPr lang="en-US"/>
           </a:p>
@@ -1420,7 +1420,7 @@
           <a:p>
             <a:fld id="{B819A100-10F6-477E-8847-29D479EF1C92}" type="datetime1">
               <a:rPr lang="en-US" smtClean="0"/>
-              <a:t>10/13/22</a:t>
+              <a:t>10/15/22</a:t>
             </a:fld>
             <a:endParaRPr lang="en-US"/>
           </a:p>
@@ -1834,7 +1834,7 @@
           <a:p>
             <a:fld id="{5DF128AB-198A-495F-8475-FDB360C9873F}" type="datetime1">
               <a:rPr lang="en-US" smtClean="0"/>
-              <a:t>10/13/22</a:t>
+              <a:t>10/15/22</a:t>
             </a:fld>
             <a:endParaRPr lang="en-US"/>
           </a:p>
@@ -1975,7 +1975,7 @@
           <a:p>
             <a:fld id="{021A235E-F8FD-479F-9FC7-18BE84110877}" type="datetime1">
               <a:rPr lang="en-US" smtClean="0"/>
-              <a:t>10/13/22</a:t>
+              <a:t>10/15/22</a:t>
             </a:fld>
             <a:endParaRPr lang="en-US"/>
           </a:p>
@@ -2088,7 +2088,7 @@
           <a:p>
             <a:fld id="{E890F09B-68DA-462E-9DB4-4C9ADAB8CBCC}" type="datetime1">
               <a:rPr lang="en-US" smtClean="0"/>
-              <a:t>10/13/22</a:t>
+              <a:t>10/15/22</a:t>
             </a:fld>
             <a:endParaRPr lang="en-US"/>
           </a:p>
@@ -2407,7 +2407,7 @@
           <a:p>
             <a:fld id="{17AC4E36-FABE-47EB-AA7F-C19A93824617}" type="datetime1">
               <a:rPr lang="en-US" smtClean="0"/>
-              <a:t>10/13/22</a:t>
+              <a:t>10/15/22</a:t>
             </a:fld>
             <a:endParaRPr lang="en-US"/>
           </a:p>
@@ -2704,7 +2704,7 @@
           <a:p>
             <a:fld id="{F199CE6B-5DE6-4A2D-B72E-5E8969F9F56F}" type="datetime1">
               <a:rPr lang="en-US" smtClean="0"/>
-              <a:t>10/13/22</a:t>
+              <a:t>10/15/22</a:t>
             </a:fld>
             <a:endParaRPr lang="en-US"/>
           </a:p>
@@ -3562,7 +3562,7 @@
           <a:p>
             <a:fld id="{F481A142-DA77-4A5F-AD1F-14E6C18F0F5F}" type="datetime1">
               <a:rPr lang="en-US" smtClean="0"/>
-              <a:t>10/13/22</a:t>
+              <a:t>10/15/22</a:t>
             </a:fld>
             <a:endParaRPr lang="en-US" dirty="0"/>
           </a:p>
@@ -9309,18 +9309,30 @@
         </p:nvSpPr>
         <p:spPr>
           <a:xfrm>
-            <a:off x="999064" y="1718733"/>
-            <a:ext cx="36576" cy="36576"/>
+            <a:off x="807041" y="1718732"/>
+            <a:ext cx="228599" cy="228599"/>
           </a:xfrm>
           <a:prstGeom prst="ellipse">
             <a:avLst/>
           </a:prstGeom>
-          <a:solidFill>
-            <a:srgbClr val="00B0F0"/>
-          </a:solidFill>
-          <a:ln>
+          <a:gradFill flip="none" rotWithShape="1">
+            <a:gsLst>
+              <a:gs pos="27000">
+                <a:srgbClr val="002060"/>
+              </a:gs>
+              <a:gs pos="100000">
+                <a:srgbClr val="00B0F0">
+                  <a:tint val="23500"/>
+                  <a:satMod val="160000"/>
+                </a:srgbClr>
+              </a:gs>
+            </a:gsLst>
+            <a:lin ang="2700000" scaled="1"/>
+            <a:tileRect/>
+          </a:gradFill>
+          <a:ln w="6350">
             <a:solidFill>
-              <a:srgbClr val="00B0F0"/>
+              <a:schemeClr val="bg1"/>
             </a:solidFill>
           </a:ln>
         </p:spPr>
@@ -9365,18 +9377,35 @@
         </p:nvSpPr>
         <p:spPr>
           <a:xfrm>
-            <a:off x="1473197" y="1718733"/>
-            <a:ext cx="82296" cy="82296"/>
+            <a:off x="1326893" y="1718733"/>
+            <a:ext cx="228600" cy="228600"/>
           </a:xfrm>
           <a:prstGeom prst="ellipse">
             <a:avLst/>
           </a:prstGeom>
-          <a:solidFill>
-            <a:srgbClr val="8B0907"/>
-          </a:solidFill>
-          <a:ln>
+          <a:gradFill flip="none" rotWithShape="1">
+            <a:gsLst>
+              <a:gs pos="21000">
+                <a:srgbClr val="8B0907">
+                  <a:shade val="30000"/>
+                  <a:satMod val="115000"/>
+                  <a:lumMod val="65577"/>
+                  <a:lumOff val="34423"/>
+                </a:srgbClr>
+              </a:gs>
+              <a:gs pos="100000">
+                <a:srgbClr val="8B0907">
+                  <a:shade val="100000"/>
+                  <a:satMod val="115000"/>
+                </a:srgbClr>
+              </a:gs>
+            </a:gsLst>
+            <a:lin ang="13500000" scaled="1"/>
+            <a:tileRect/>
+          </a:gradFill>
+          <a:ln w="6350">
             <a:solidFill>
-              <a:srgbClr val="8B0907"/>
+              <a:schemeClr val="bg1"/>
             </a:solidFill>
           </a:ln>
         </p:spPr>
@@ -9421,18 +9450,39 @@
         </p:nvSpPr>
         <p:spPr>
           <a:xfrm>
-            <a:off x="2038770" y="1718733"/>
-            <a:ext cx="146304" cy="146304"/>
+            <a:off x="1956474" y="1718733"/>
+            <a:ext cx="228600" cy="228600"/>
           </a:xfrm>
           <a:prstGeom prst="ellipse">
             <a:avLst/>
           </a:prstGeom>
-          <a:solidFill>
-            <a:srgbClr val="FFC000"/>
-          </a:solidFill>
-          <a:ln>
+          <a:gradFill flip="none" rotWithShape="1">
+            <a:gsLst>
+              <a:gs pos="0">
+                <a:srgbClr val="FFC000">
+                  <a:shade val="30000"/>
+                  <a:satMod val="115000"/>
+                </a:srgbClr>
+              </a:gs>
+              <a:gs pos="50000">
+                <a:srgbClr val="FFC000">
+                  <a:shade val="67500"/>
+                  <a:satMod val="115000"/>
+                </a:srgbClr>
+              </a:gs>
+              <a:gs pos="100000">
+                <a:srgbClr val="FFC000">
+                  <a:shade val="100000"/>
+                  <a:satMod val="115000"/>
+                </a:srgbClr>
+              </a:gs>
+            </a:gsLst>
+            <a:lin ang="2700000" scaled="1"/>
+            <a:tileRect/>
+          </a:gradFill>
+          <a:ln w="6350">
             <a:solidFill>
-              <a:srgbClr val="FFC000"/>
+              <a:schemeClr val="bg1"/>
             </a:solidFill>
           </a:ln>
         </p:spPr>
@@ -9483,12 +9533,32 @@
           <a:prstGeom prst="ellipse">
             <a:avLst/>
           </a:prstGeom>
-          <a:solidFill>
-            <a:schemeClr val="accent1"/>
-          </a:solidFill>
-          <a:ln>
+          <a:gradFill flip="none" rotWithShape="1">
+            <a:gsLst>
+              <a:gs pos="0">
+                <a:schemeClr val="accent1">
+                  <a:lumMod val="67000"/>
+                </a:schemeClr>
+              </a:gs>
+              <a:gs pos="48000">
+                <a:schemeClr val="accent1">
+                  <a:lumMod val="97000"/>
+                  <a:lumOff val="3000"/>
+                </a:schemeClr>
+              </a:gs>
+              <a:gs pos="100000">
+                <a:schemeClr val="accent1">
+                  <a:lumMod val="60000"/>
+                  <a:lumOff val="40000"/>
+                </a:schemeClr>
+              </a:gs>
+            </a:gsLst>
+            <a:lin ang="2700000" scaled="1"/>
+            <a:tileRect/>
+          </a:gradFill>
+          <a:ln w="6350">
             <a:solidFill>
-              <a:schemeClr val="accent1"/>
+              <a:schemeClr val="bg1"/>
             </a:solidFill>
           </a:ln>
         </p:spPr>
@@ -9534,17 +9604,25 @@
         <p:spPr>
           <a:xfrm>
             <a:off x="3809996" y="1718733"/>
-            <a:ext cx="329184" cy="329184"/>
+            <a:ext cx="228600" cy="228600"/>
           </a:xfrm>
           <a:prstGeom prst="ellipse">
             <a:avLst/>
           </a:prstGeom>
-          <a:solidFill>
-            <a:srgbClr val="FF00EF"/>
-          </a:solidFill>
-          <a:ln>
+          <a:gradFill>
+            <a:gsLst>
+              <a:gs pos="35000">
+                <a:srgbClr val="EB5800"/>
+              </a:gs>
+              <a:gs pos="94000">
+                <a:srgbClr val="FFA57C"/>
+              </a:gs>
+            </a:gsLst>
+            <a:lin ang="2700000" scaled="1"/>
+          </a:gradFill>
+          <a:ln w="6350">
             <a:solidFill>
-              <a:srgbClr val="FF00EF"/>
+              <a:schemeClr val="bg1"/>
             </a:solidFill>
           </a:ln>
         </p:spPr>
@@ -9589,18 +9667,31 @@
         </p:nvSpPr>
         <p:spPr>
           <a:xfrm>
-            <a:off x="5321499" y="1703493"/>
-            <a:ext cx="448056" cy="448056"/>
+            <a:off x="4904059" y="1703492"/>
+            <a:ext cx="228599" cy="228599"/>
           </a:xfrm>
           <a:prstGeom prst="ellipse">
             <a:avLst/>
           </a:prstGeom>
-          <a:solidFill>
-            <a:srgbClr val="00B050"/>
-          </a:solidFill>
-          <a:ln>
+          <a:gradFill>
+            <a:gsLst>
+              <a:gs pos="35000">
+                <a:schemeClr val="accent6">
+                  <a:lumMod val="50000"/>
+                </a:schemeClr>
+              </a:gs>
+              <a:gs pos="94000">
+                <a:schemeClr val="accent6">
+                  <a:lumMod val="60000"/>
+                  <a:lumOff val="40000"/>
+                </a:schemeClr>
+              </a:gs>
+            </a:gsLst>
+            <a:lin ang="2700000" scaled="1"/>
+          </a:gradFill>
+          <a:ln w="6350">
             <a:solidFill>
-              <a:srgbClr val="00B050"/>
+              <a:schemeClr val="bg1"/>
             </a:solidFill>
           </a:ln>
         </p:spPr>
@@ -9649,18 +9740,26 @@
         </p:nvSpPr>
         <p:spPr>
           <a:xfrm>
-            <a:off x="7501462" y="1703493"/>
-            <a:ext cx="585216" cy="585216"/>
+            <a:off x="5959897" y="1701983"/>
+            <a:ext cx="228599" cy="228599"/>
           </a:xfrm>
           <a:prstGeom prst="ellipse">
             <a:avLst/>
           </a:prstGeom>
-          <a:solidFill>
-            <a:srgbClr val="F66C4F"/>
-          </a:solidFill>
-          <a:ln>
+          <a:gradFill>
+            <a:gsLst>
+              <a:gs pos="34000">
+                <a:srgbClr val="D500CA"/>
+              </a:gs>
+              <a:gs pos="94000">
+                <a:srgbClr val="FFA1ED"/>
+              </a:gs>
+            </a:gsLst>
+            <a:lin ang="2700000" scaled="1"/>
+          </a:gradFill>
+          <a:ln w="6350">
             <a:solidFill>
-              <a:srgbClr val="F66C4F"/>
+              <a:schemeClr val="bg1"/>
             </a:solidFill>
           </a:ln>
         </p:spPr>

</xml_diff>